<commit_message>
Restructured Vignettes and added Hex Sticker
</commit_message>
<xml_diff>
--- a/vignettes/figures.pptx
+++ b/vignettes/figures.pptx
@@ -6,6 +6,10 @@
   </p:sldMasterIdLst>
   <p:sldIdLst>
     <p:sldId id="257" r:id="rId2"/>
+    <p:sldId id="258" r:id="rId3"/>
+    <p:sldId id="259" r:id="rId4"/>
+    <p:sldId id="260" r:id="rId5"/>
+    <p:sldId id="261" r:id="rId6"/>
   </p:sldIdLst>
   <p:sldSz cx="12192000" cy="6858000"/>
   <p:notesSz cx="6858000" cy="9144000"/>
@@ -3842,7 +3846,7 @@
                 <a:ea typeface="CMU Serif" panose="02000603000000000000" pitchFamily="2" charset="0"/>
                 <a:cs typeface="CMU Serif" panose="02000603000000000000" pitchFamily="2" charset="0"/>
               </a:rPr>
-              <a:t>do_scrape</a:t>
+              <a:t>map_scrape</a:t>
             </a:r>
             <a:r>
               <a:rPr lang="de-DE" sz="2400" dirty="0">
@@ -4996,6 +5000,610 @@
     <p:extLst>
       <p:ext uri="{BB962C8B-B14F-4D97-AF65-F5344CB8AC3E}">
         <p14:creationId xmlns:p14="http://schemas.microsoft.com/office/powerpoint/2010/main" val="700706780"/>
+      </p:ext>
+    </p:extLst>
+  </p:cSld>
+  <p:clrMapOvr>
+    <a:masterClrMapping/>
+  </p:clrMapOvr>
+</p:sld>
+</file>
+
+<file path=ppt/slides/slide2.xml><?xml version="1.0" encoding="utf-8"?>
+<p:sld xmlns:a="http://schemas.openxmlformats.org/drawingml/2006/main" xmlns:r="http://schemas.openxmlformats.org/officeDocument/2006/relationships" xmlns:p="http://schemas.openxmlformats.org/presentationml/2006/main">
+  <p:cSld>
+    <p:spTree>
+      <p:nvGrpSpPr>
+        <p:cNvPr id="1" name=""/>
+        <p:cNvGrpSpPr/>
+        <p:nvPr/>
+      </p:nvGrpSpPr>
+      <p:grpSpPr>
+        <a:xfrm>
+          <a:off x="0" y="0"/>
+          <a:ext cx="0" cy="0"/>
+          <a:chOff x="0" y="0"/>
+          <a:chExt cx="0" cy="0"/>
+        </a:xfrm>
+      </p:grpSpPr>
+      <p:pic>
+        <p:nvPicPr>
+          <p:cNvPr id="5" name="Grafik 4">
+            <a:extLst>
+              <a:ext uri="{FF2B5EF4-FFF2-40B4-BE49-F238E27FC236}">
+                <a16:creationId xmlns:a16="http://schemas.microsoft.com/office/drawing/2014/main" id="{252AA1E8-99BD-4814-A047-6C6E8C515829}"/>
+              </a:ext>
+            </a:extLst>
+          </p:cNvPr>
+          <p:cNvPicPr>
+            <a:picLocks noChangeAspect="1"/>
+          </p:cNvPicPr>
+          <p:nvPr/>
+        </p:nvPicPr>
+        <p:blipFill>
+          <a:blip r:embed="rId2">
+            <a:extLst>
+              <a:ext uri="{28A0092B-C50C-407E-A947-70E740481C1C}">
+                <a14:useLocalDpi xmlns:a14="http://schemas.microsoft.com/office/drawing/2010/main" val="0"/>
+              </a:ext>
+              <a:ext uri="{96DAC541-7B7A-43D3-8B79-37D633B846F1}">
+                <asvg:svgBlip xmlns:asvg="http://schemas.microsoft.com/office/drawing/2016/SVG/main" r:embed="rId3"/>
+              </a:ext>
+            </a:extLst>
+          </a:blip>
+          <a:stretch>
+            <a:fillRect/>
+          </a:stretch>
+        </p:blipFill>
+        <p:spPr>
+          <a:xfrm>
+            <a:off x="698862" y="455813"/>
+            <a:ext cx="6480000" cy="1313672"/>
+          </a:xfrm>
+          <a:prstGeom prst="rect">
+            <a:avLst/>
+          </a:prstGeom>
+        </p:spPr>
+      </p:pic>
+      <p:pic>
+        <p:nvPicPr>
+          <p:cNvPr id="9" name="Grafik 8">
+            <a:extLst>
+              <a:ext uri="{FF2B5EF4-FFF2-40B4-BE49-F238E27FC236}">
+                <a16:creationId xmlns:a16="http://schemas.microsoft.com/office/drawing/2014/main" id="{52553E83-1C76-42C4-8DF0-84DD52E0384D}"/>
+              </a:ext>
+            </a:extLst>
+          </p:cNvPr>
+          <p:cNvPicPr>
+            <a:picLocks noChangeAspect="1"/>
+          </p:cNvPicPr>
+          <p:nvPr/>
+        </p:nvPicPr>
+        <p:blipFill>
+          <a:blip r:embed="rId4">
+            <a:extLst>
+              <a:ext uri="{28A0092B-C50C-407E-A947-70E740481C1C}">
+                <a14:useLocalDpi xmlns:a14="http://schemas.microsoft.com/office/drawing/2010/main" val="0"/>
+              </a:ext>
+              <a:ext uri="{96DAC541-7B7A-43D3-8B79-37D633B846F1}">
+                <asvg:svgBlip xmlns:asvg="http://schemas.microsoft.com/office/drawing/2016/SVG/main" r:embed="rId5"/>
+              </a:ext>
+            </a:extLst>
+          </a:blip>
+          <a:stretch>
+            <a:fillRect/>
+          </a:stretch>
+        </p:blipFill>
+        <p:spPr>
+          <a:xfrm>
+            <a:off x="698862" y="2351710"/>
+            <a:ext cx="6480000" cy="2325436"/>
+          </a:xfrm>
+          <a:prstGeom prst="rect">
+            <a:avLst/>
+          </a:prstGeom>
+        </p:spPr>
+      </p:pic>
+    </p:spTree>
+    <p:extLst>
+      <p:ext uri="{BB962C8B-B14F-4D97-AF65-F5344CB8AC3E}">
+        <p14:creationId xmlns:p14="http://schemas.microsoft.com/office/powerpoint/2010/main" val="212512123"/>
+      </p:ext>
+    </p:extLst>
+  </p:cSld>
+  <p:clrMapOvr>
+    <a:masterClrMapping/>
+  </p:clrMapOvr>
+</p:sld>
+</file>
+
+<file path=ppt/slides/slide3.xml><?xml version="1.0" encoding="utf-8"?>
+<p:sld xmlns:a="http://schemas.openxmlformats.org/drawingml/2006/main" xmlns:r="http://schemas.openxmlformats.org/officeDocument/2006/relationships" xmlns:p="http://schemas.openxmlformats.org/presentationml/2006/main">
+  <p:cSld>
+    <p:spTree>
+      <p:nvGrpSpPr>
+        <p:cNvPr id="1" name=""/>
+        <p:cNvGrpSpPr/>
+        <p:nvPr/>
+      </p:nvGrpSpPr>
+      <p:grpSpPr>
+        <a:xfrm>
+          <a:off x="0" y="0"/>
+          <a:ext cx="0" cy="0"/>
+          <a:chOff x="0" y="0"/>
+          <a:chExt cx="0" cy="0"/>
+        </a:xfrm>
+      </p:grpSpPr>
+      <p:pic>
+        <p:nvPicPr>
+          <p:cNvPr id="9" name="Grafik 8">
+            <a:extLst>
+              <a:ext uri="{FF2B5EF4-FFF2-40B4-BE49-F238E27FC236}">
+                <a16:creationId xmlns:a16="http://schemas.microsoft.com/office/drawing/2014/main" id="{AF96FAB5-7192-417E-A704-AB5464B1702B}"/>
+              </a:ext>
+            </a:extLst>
+          </p:cNvPr>
+          <p:cNvPicPr>
+            <a:picLocks noChangeAspect="1"/>
+          </p:cNvPicPr>
+          <p:nvPr/>
+        </p:nvPicPr>
+        <p:blipFill>
+          <a:blip r:embed="rId2">
+            <a:extLst>
+              <a:ext uri="{28A0092B-C50C-407E-A947-70E740481C1C}">
+                <a14:useLocalDpi xmlns:a14="http://schemas.microsoft.com/office/drawing/2010/main" val="0"/>
+              </a:ext>
+            </a:extLst>
+          </a:blip>
+          <a:stretch>
+            <a:fillRect/>
+          </a:stretch>
+        </p:blipFill>
+        <p:spPr>
+          <a:xfrm>
+            <a:off x="831762" y="7"/>
+            <a:ext cx="3239495" cy="3166536"/>
+          </a:xfrm>
+          <a:prstGeom prst="rect">
+            <a:avLst/>
+          </a:prstGeom>
+        </p:spPr>
+      </p:pic>
+    </p:spTree>
+    <p:extLst>
+      <p:ext uri="{BB962C8B-B14F-4D97-AF65-F5344CB8AC3E}">
+        <p14:creationId xmlns:p14="http://schemas.microsoft.com/office/powerpoint/2010/main" val="347592346"/>
+      </p:ext>
+    </p:extLst>
+  </p:cSld>
+  <p:clrMapOvr>
+    <a:masterClrMapping/>
+  </p:clrMapOvr>
+</p:sld>
+</file>
+
+<file path=ppt/slides/slide4.xml><?xml version="1.0" encoding="utf-8"?>
+<p:sld xmlns:a="http://schemas.openxmlformats.org/drawingml/2006/main" xmlns:r="http://schemas.openxmlformats.org/officeDocument/2006/relationships" xmlns:p="http://schemas.openxmlformats.org/presentationml/2006/main">
+  <p:cSld>
+    <p:spTree>
+      <p:nvGrpSpPr>
+        <p:cNvPr id="1" name=""/>
+        <p:cNvGrpSpPr/>
+        <p:nvPr/>
+      </p:nvGrpSpPr>
+      <p:grpSpPr>
+        <a:xfrm>
+          <a:off x="0" y="0"/>
+          <a:ext cx="0" cy="0"/>
+          <a:chOff x="0" y="0"/>
+          <a:chExt cx="0" cy="0"/>
+        </a:xfrm>
+      </p:grpSpPr>
+      <p:pic>
+        <p:nvPicPr>
+          <p:cNvPr id="13" name="Grafik 12">
+            <a:extLst>
+              <a:ext uri="{FF2B5EF4-FFF2-40B4-BE49-F238E27FC236}">
+                <a16:creationId xmlns:a16="http://schemas.microsoft.com/office/drawing/2014/main" id="{49C3197F-85EE-4355-9610-EFDA3AD03686}"/>
+              </a:ext>
+            </a:extLst>
+          </p:cNvPr>
+          <p:cNvPicPr>
+            <a:picLocks noChangeAspect="1"/>
+          </p:cNvPicPr>
+          <p:nvPr/>
+        </p:nvPicPr>
+        <p:blipFill>
+          <a:blip r:embed="rId2"/>
+          <a:stretch>
+            <a:fillRect/>
+          </a:stretch>
+        </p:blipFill>
+        <p:spPr>
+          <a:xfrm rot="231999">
+            <a:off x="1375384" y="1303333"/>
+            <a:ext cx="4665760" cy="4050795"/>
+          </a:xfrm>
+          <a:prstGeom prst="rect">
+            <a:avLst/>
+          </a:prstGeom>
+        </p:spPr>
+      </p:pic>
+      <p:sp>
+        <p:nvSpPr>
+          <p:cNvPr id="8" name="Textfeld 7">
+            <a:extLst>
+              <a:ext uri="{FF2B5EF4-FFF2-40B4-BE49-F238E27FC236}">
+                <a16:creationId xmlns:a16="http://schemas.microsoft.com/office/drawing/2014/main" id="{421FE135-9865-4A6B-BBA2-353B171B13E1}"/>
+              </a:ext>
+            </a:extLst>
+          </p:cNvPr>
+          <p:cNvSpPr txBox="1"/>
+          <p:nvPr/>
+        </p:nvSpPr>
+        <p:spPr>
+          <a:xfrm rot="17768245">
+            <a:off x="-109108" y="1828453"/>
+            <a:ext cx="2953436" cy="584775"/>
+          </a:xfrm>
+          <a:prstGeom prst="rect">
+            <a:avLst/>
+          </a:prstGeom>
+          <a:noFill/>
+        </p:spPr>
+        <p:txBody>
+          <a:bodyPr wrap="square" rtlCol="0">
+            <a:spAutoFit/>
+          </a:bodyPr>
+          <a:lstStyle/>
+          <a:p>
+            <a:pPr algn="ctr"/>
+            <a:r>
+              <a:rPr lang="de-DE" sz="3200" b="1" dirty="0">
+                <a:latin typeface="Lucida Console" panose="020B0609040504020204" pitchFamily="49" charset="0"/>
+                <a:ea typeface="CMU Serif" panose="02000603000000000000" pitchFamily="2" charset="0"/>
+                <a:cs typeface="CMU Serif" panose="02000603000000000000" pitchFamily="2" charset="0"/>
+              </a:rPr>
+              <a:t>&lt;</a:t>
+            </a:r>
+            <a:r>
+              <a:rPr lang="de-DE" sz="3200" b="1" dirty="0" err="1">
+                <a:latin typeface="Lucida Console" panose="020B0609040504020204" pitchFamily="49" charset="0"/>
+                <a:ea typeface="CMU Serif" panose="02000603000000000000" pitchFamily="2" charset="0"/>
+                <a:cs typeface="CMU Serif" panose="02000603000000000000" pitchFamily="2" charset="0"/>
+              </a:rPr>
+              <a:t>scrapurrr</a:t>
+            </a:r>
+            <a:r>
+              <a:rPr lang="de-DE" sz="3200" b="1" dirty="0">
+                <a:latin typeface="Lucida Console" panose="020B0609040504020204" pitchFamily="49" charset="0"/>
+                <a:ea typeface="CMU Serif" panose="02000603000000000000" pitchFamily="2" charset="0"/>
+                <a:cs typeface="CMU Serif" panose="02000603000000000000" pitchFamily="2" charset="0"/>
+              </a:rPr>
+              <a:t>&gt;</a:t>
+            </a:r>
+          </a:p>
+        </p:txBody>
+      </p:sp>
+      <p:sp>
+        <p:nvSpPr>
+          <p:cNvPr id="9" name="Sechseck 8">
+            <a:extLst>
+              <a:ext uri="{FF2B5EF4-FFF2-40B4-BE49-F238E27FC236}">
+                <a16:creationId xmlns:a16="http://schemas.microsoft.com/office/drawing/2014/main" id="{0A1E9479-B0DE-49BA-86C7-58EB9D25B0AA}"/>
+              </a:ext>
+            </a:extLst>
+          </p:cNvPr>
+          <p:cNvSpPr/>
+          <p:nvPr/>
+        </p:nvSpPr>
+        <p:spPr>
+          <a:xfrm>
+            <a:off x="456970" y="774697"/>
+            <a:ext cx="5400000" cy="4680000"/>
+          </a:xfrm>
+          <a:prstGeom prst="hexagon">
+            <a:avLst/>
+          </a:prstGeom>
+          <a:noFill/>
+          <a:ln w="76200">
+            <a:solidFill>
+              <a:schemeClr val="tx1"/>
+            </a:solidFill>
+          </a:ln>
+        </p:spPr>
+        <p:style>
+          <a:lnRef idx="2">
+            <a:schemeClr val="accent1">
+              <a:shade val="50000"/>
+            </a:schemeClr>
+          </a:lnRef>
+          <a:fillRef idx="1">
+            <a:schemeClr val="accent1"/>
+          </a:fillRef>
+          <a:effectRef idx="0">
+            <a:schemeClr val="accent1"/>
+          </a:effectRef>
+          <a:fontRef idx="minor">
+            <a:schemeClr val="lt1"/>
+          </a:fontRef>
+        </p:style>
+        <p:txBody>
+          <a:bodyPr rtlCol="0" anchor="ctr"/>
+          <a:lstStyle/>
+          <a:p>
+            <a:pPr algn="ctr"/>
+            <a:endParaRPr lang="de-DE"/>
+          </a:p>
+        </p:txBody>
+      </p:sp>
+      <p:grpSp>
+        <p:nvGrpSpPr>
+          <p:cNvPr id="20" name="Gruppieren 19">
+            <a:extLst>
+              <a:ext uri="{FF2B5EF4-FFF2-40B4-BE49-F238E27FC236}">
+                <a16:creationId xmlns:a16="http://schemas.microsoft.com/office/drawing/2014/main" id="{3DF64A47-8FC3-4F4E-905C-BC6B0ED769BE}"/>
+              </a:ext>
+            </a:extLst>
+          </p:cNvPr>
+          <p:cNvGrpSpPr/>
+          <p:nvPr/>
+        </p:nvGrpSpPr>
+        <p:grpSpPr>
+          <a:xfrm>
+            <a:off x="6095999" y="552073"/>
+            <a:ext cx="5584174" cy="4902623"/>
+            <a:chOff x="6095999" y="552073"/>
+            <a:chExt cx="5584174" cy="4902623"/>
+          </a:xfrm>
+        </p:grpSpPr>
+        <p:sp>
+          <p:nvSpPr>
+            <p:cNvPr id="18" name="Textfeld 17">
+              <a:extLst>
+                <a:ext uri="{FF2B5EF4-FFF2-40B4-BE49-F238E27FC236}">
+                  <a16:creationId xmlns:a16="http://schemas.microsoft.com/office/drawing/2014/main" id="{AB0CDF3B-78BA-4CEA-A22C-533C263D2C58}"/>
+                </a:ext>
+              </a:extLst>
+            </p:cNvPr>
+            <p:cNvSpPr txBox="1"/>
+            <p:nvPr/>
+          </p:nvSpPr>
+          <p:spPr>
+            <a:xfrm rot="17760000">
+              <a:off x="5405553" y="1851789"/>
+              <a:ext cx="3184207" cy="584775"/>
+            </a:xfrm>
+            <a:prstGeom prst="rect">
+              <a:avLst/>
+            </a:prstGeom>
+            <a:noFill/>
+          </p:spPr>
+          <p:txBody>
+            <a:bodyPr wrap="square" rtlCol="0">
+              <a:spAutoFit/>
+            </a:bodyPr>
+            <a:lstStyle/>
+            <a:p>
+              <a:pPr algn="ctr"/>
+              <a:r>
+                <a:rPr lang="de-DE" sz="3100" b="1" dirty="0">
+                  <a:latin typeface="Lucida Console" panose="020B0609040504020204" pitchFamily="49" charset="0"/>
+                  <a:ea typeface="CMU Serif" panose="02000603000000000000" pitchFamily="2" charset="0"/>
+                  <a:cs typeface="CMU Serif" panose="02000603000000000000" pitchFamily="2" charset="0"/>
+                </a:rPr>
+                <a:t>&lt;</a:t>
+              </a:r>
+              <a:r>
+                <a:rPr lang="de-DE" sz="3100" b="1" dirty="0" err="1">
+                  <a:latin typeface="Lucida Console" panose="020B0609040504020204" pitchFamily="49" charset="0"/>
+                  <a:ea typeface="CMU Serif" panose="02000603000000000000" pitchFamily="2" charset="0"/>
+                  <a:cs typeface="CMU Serif" panose="02000603000000000000" pitchFamily="2" charset="0"/>
+                </a:rPr>
+                <a:t>scrapurrr</a:t>
+              </a:r>
+              <a:r>
+                <a:rPr lang="de-DE" sz="3100" b="1" dirty="0">
+                  <a:latin typeface="Lucida Console" panose="020B0609040504020204" pitchFamily="49" charset="0"/>
+                  <a:ea typeface="CMU Serif" panose="02000603000000000000" pitchFamily="2" charset="0"/>
+                  <a:cs typeface="CMU Serif" panose="02000603000000000000" pitchFamily="2" charset="0"/>
+                </a:rPr>
+                <a:t>/&gt;</a:t>
+              </a:r>
+            </a:p>
+          </p:txBody>
+        </p:sp>
+        <p:sp>
+          <p:nvSpPr>
+            <p:cNvPr id="19" name="Sechseck 18">
+              <a:extLst>
+                <a:ext uri="{FF2B5EF4-FFF2-40B4-BE49-F238E27FC236}">
+                  <a16:creationId xmlns:a16="http://schemas.microsoft.com/office/drawing/2014/main" id="{E00960FA-D87A-4AAD-891E-16EB11666A73}"/>
+                </a:ext>
+              </a:extLst>
+            </p:cNvPr>
+            <p:cNvSpPr/>
+            <p:nvPr/>
+          </p:nvSpPr>
+          <p:spPr>
+            <a:xfrm>
+              <a:off x="6095999" y="774696"/>
+              <a:ext cx="5400000" cy="4680000"/>
+            </a:xfrm>
+            <a:prstGeom prst="hexagon">
+              <a:avLst/>
+            </a:prstGeom>
+            <a:noFill/>
+            <a:ln w="76200">
+              <a:solidFill>
+                <a:schemeClr val="tx1"/>
+              </a:solidFill>
+            </a:ln>
+          </p:spPr>
+          <p:style>
+            <a:lnRef idx="2">
+              <a:schemeClr val="accent1">
+                <a:shade val="50000"/>
+              </a:schemeClr>
+            </a:lnRef>
+            <a:fillRef idx="1">
+              <a:schemeClr val="accent1"/>
+            </a:fillRef>
+            <a:effectRef idx="0">
+              <a:schemeClr val="accent1"/>
+            </a:effectRef>
+            <a:fontRef idx="minor">
+              <a:schemeClr val="lt1"/>
+            </a:fontRef>
+          </p:style>
+          <p:txBody>
+            <a:bodyPr rtlCol="0" anchor="ctr"/>
+            <a:lstStyle/>
+            <a:p>
+              <a:pPr algn="ctr"/>
+              <a:endParaRPr lang="de-DE"/>
+            </a:p>
+          </p:txBody>
+        </p:sp>
+        <p:pic>
+          <p:nvPicPr>
+            <p:cNvPr id="17" name="Grafik 16">
+              <a:extLst>
+                <a:ext uri="{FF2B5EF4-FFF2-40B4-BE49-F238E27FC236}">
+                  <a16:creationId xmlns:a16="http://schemas.microsoft.com/office/drawing/2014/main" id="{318A056E-16E8-4550-BDF9-9AFFEE97D2D6}"/>
+                </a:ext>
+              </a:extLst>
+            </p:cNvPr>
+            <p:cNvPicPr>
+              <a:picLocks noChangeAspect="1"/>
+            </p:cNvPicPr>
+            <p:nvPr/>
+          </p:nvPicPr>
+          <p:blipFill>
+            <a:blip r:embed="rId3">
+              <a:extLst>
+                <a:ext uri="{BEBA8EAE-BF5A-486C-A8C5-ECC9F3942E4B}">
+                  <a14:imgProps xmlns:a14="http://schemas.microsoft.com/office/drawing/2010/main">
+                    <a14:imgLayer r:embed="rId4">
+                      <a14:imgEffect>
+                        <a14:backgroundRemoval t="2736" b="96026" l="4453" r="89879">
+                          <a14:foregroundMark x1="55813" y1="49251" x2="55813" y2="49251"/>
+                          <a14:foregroundMark x1="56217" y1="52313" x2="56217" y2="52313"/>
+                          <a14:foregroundMark x1="77791" y1="74267" x2="77791" y2="74267"/>
+                          <a14:foregroundMark x1="75882" y1="82085" x2="75882" y2="82085"/>
+                          <a14:foregroundMark x1="74378" y1="85016" x2="74378" y2="85016"/>
+                          <a14:foregroundMark x1="73048" y1="87036" x2="73048" y2="87036"/>
+                          <a14:foregroundMark x1="64257" y1="94853" x2="64257" y2="94853"/>
+                          <a14:foregroundMark x1="58300" y1="96221" x2="58300" y2="96221"/>
+                          <a14:foregroundMark x1="8965" y1="48730" x2="8965" y2="48730"/>
+                          <a14:foregroundMark x1="4511" y1="37524" x2="4511" y2="37524"/>
+                          <a14:foregroundMark x1="9023" y1="32508" x2="9023" y2="32508"/>
+                          <a14:foregroundMark x1="9427" y1="29577" x2="9427" y2="29577"/>
+                          <a14:foregroundMark x1="11741" y1="2736" x2="11741" y2="2736"/>
+                          <a14:foregroundMark x1="15789" y1="2997" x2="15789" y2="2997"/>
+                          <a14:foregroundMark x1="8849" y1="27557" x2="8849" y2="27557"/>
+                          <a14:foregroundMark x1="68363" y1="30619" x2="68363" y2="30619"/>
+                          <a14:foregroundMark x1="68421" y1="29902" x2="68421" y2="29902"/>
+                          <a14:foregroundMark x1="71197" y1="29707" x2="71197" y2="29707"/>
+                        </a14:backgroundRemoval>
+                      </a14:imgEffect>
+                      <a14:imgEffect>
+                        <a14:brightnessContrast bright="40000"/>
+                      </a14:imgEffect>
+                    </a14:imgLayer>
+                  </a14:imgProps>
+                </a:ext>
+              </a:extLst>
+            </a:blip>
+            <a:stretch>
+              <a:fillRect/>
+            </a:stretch>
+          </p:blipFill>
+          <p:spPr>
+            <a:xfrm rot="231999">
+              <a:off x="7014413" y="1303332"/>
+              <a:ext cx="4665760" cy="4050795"/>
+            </a:xfrm>
+            <a:prstGeom prst="rect">
+              <a:avLst/>
+            </a:prstGeom>
+          </p:spPr>
+        </p:pic>
+      </p:grpSp>
+    </p:spTree>
+    <p:extLst>
+      <p:ext uri="{BB962C8B-B14F-4D97-AF65-F5344CB8AC3E}">
+        <p14:creationId xmlns:p14="http://schemas.microsoft.com/office/powerpoint/2010/main" val="2208120252"/>
+      </p:ext>
+    </p:extLst>
+  </p:cSld>
+  <p:clrMapOvr>
+    <a:masterClrMapping/>
+  </p:clrMapOvr>
+</p:sld>
+</file>
+
+<file path=ppt/slides/slide5.xml><?xml version="1.0" encoding="utf-8"?>
+<p:sld xmlns:a="http://schemas.openxmlformats.org/drawingml/2006/main" xmlns:r="http://schemas.openxmlformats.org/officeDocument/2006/relationships" xmlns:p="http://schemas.openxmlformats.org/presentationml/2006/main">
+  <p:cSld>
+    <p:spTree>
+      <p:nvGrpSpPr>
+        <p:cNvPr id="1" name=""/>
+        <p:cNvGrpSpPr/>
+        <p:nvPr/>
+      </p:nvGrpSpPr>
+      <p:grpSpPr>
+        <a:xfrm>
+          <a:off x="0" y="0"/>
+          <a:ext cx="0" cy="0"/>
+          <a:chOff x="0" y="0"/>
+          <a:chExt cx="0" cy="0"/>
+        </a:xfrm>
+      </p:grpSpPr>
+      <p:pic>
+        <p:nvPicPr>
+          <p:cNvPr id="5" name="Grafik 4">
+            <a:extLst>
+              <a:ext uri="{FF2B5EF4-FFF2-40B4-BE49-F238E27FC236}">
+                <a16:creationId xmlns:a16="http://schemas.microsoft.com/office/drawing/2014/main" id="{49DC70F0-E057-4CEC-AF5C-33DF5BAF6905}"/>
+              </a:ext>
+            </a:extLst>
+          </p:cNvPr>
+          <p:cNvPicPr>
+            <a:picLocks noChangeAspect="1"/>
+          </p:cNvPicPr>
+          <p:nvPr/>
+        </p:nvPicPr>
+        <p:blipFill>
+          <a:blip r:embed="rId2">
+            <a:extLst>
+              <a:ext uri="{28A0092B-C50C-407E-A947-70E740481C1C}">
+                <a14:useLocalDpi xmlns:a14="http://schemas.microsoft.com/office/drawing/2010/main" val="0"/>
+              </a:ext>
+              <a:ext uri="{96DAC541-7B7A-43D3-8B79-37D633B846F1}">
+                <asvg:svgBlip xmlns:asvg="http://schemas.microsoft.com/office/drawing/2016/SVG/main" r:embed="rId3"/>
+              </a:ext>
+            </a:extLst>
+          </a:blip>
+          <a:stretch>
+            <a:fillRect/>
+          </a:stretch>
+        </p:blipFill>
+        <p:spPr>
+          <a:xfrm>
+            <a:off x="1815553" y="698501"/>
+            <a:ext cx="1800000" cy="1537765"/>
+          </a:xfrm>
+          <a:prstGeom prst="rect">
+            <a:avLst/>
+          </a:prstGeom>
+        </p:spPr>
+      </p:pic>
+    </p:spTree>
+    <p:extLst>
+      <p:ext uri="{BB962C8B-B14F-4D97-AF65-F5344CB8AC3E}">
+        <p14:creationId xmlns:p14="http://schemas.microsoft.com/office/powerpoint/2010/main" val="466638107"/>
       </p:ext>
     </p:extLst>
   </p:cSld>

</xml_diff>

<commit_message>
Fixed bug where delaying would not work
</commit_message>
<xml_diff>
--- a/vignettes/figures.pptx
+++ b/vignettes/figures.pptx
@@ -10,6 +10,8 @@
     <p:sldId id="259" r:id="rId4"/>
     <p:sldId id="260" r:id="rId5"/>
     <p:sldId id="261" r:id="rId6"/>
+    <p:sldId id="262" r:id="rId7"/>
+    <p:sldId id="263" r:id="rId8"/>
   </p:sldIdLst>
   <p:sldSz cx="12192000" cy="6858000"/>
   <p:notesSz cx="6858000" cy="9144000"/>
@@ -263,7 +265,7 @@
           <a:p>
             <a:fld id="{7BDCC88A-52A5-4FAB-AE11-7E08D20B4223}" type="datetimeFigureOut">
               <a:rPr lang="de-DE" smtClean="0"/>
-              <a:t>10.11.2021</a:t>
+              <a:t>15.12.2021</a:t>
             </a:fld>
             <a:endParaRPr lang="de-DE"/>
           </a:p>
@@ -461,7 +463,7 @@
           <a:p>
             <a:fld id="{7BDCC88A-52A5-4FAB-AE11-7E08D20B4223}" type="datetimeFigureOut">
               <a:rPr lang="de-DE" smtClean="0"/>
-              <a:t>10.11.2021</a:t>
+              <a:t>15.12.2021</a:t>
             </a:fld>
             <a:endParaRPr lang="de-DE"/>
           </a:p>
@@ -669,7 +671,7 @@
           <a:p>
             <a:fld id="{7BDCC88A-52A5-4FAB-AE11-7E08D20B4223}" type="datetimeFigureOut">
               <a:rPr lang="de-DE" smtClean="0"/>
-              <a:t>10.11.2021</a:t>
+              <a:t>15.12.2021</a:t>
             </a:fld>
             <a:endParaRPr lang="de-DE"/>
           </a:p>
@@ -867,7 +869,7 @@
           <a:p>
             <a:fld id="{7BDCC88A-52A5-4FAB-AE11-7E08D20B4223}" type="datetimeFigureOut">
               <a:rPr lang="de-DE" smtClean="0"/>
-              <a:t>10.11.2021</a:t>
+              <a:t>15.12.2021</a:t>
             </a:fld>
             <a:endParaRPr lang="de-DE"/>
           </a:p>
@@ -1142,7 +1144,7 @@
           <a:p>
             <a:fld id="{7BDCC88A-52A5-4FAB-AE11-7E08D20B4223}" type="datetimeFigureOut">
               <a:rPr lang="de-DE" smtClean="0"/>
-              <a:t>10.11.2021</a:t>
+              <a:t>15.12.2021</a:t>
             </a:fld>
             <a:endParaRPr lang="de-DE"/>
           </a:p>
@@ -1407,7 +1409,7 @@
           <a:p>
             <a:fld id="{7BDCC88A-52A5-4FAB-AE11-7E08D20B4223}" type="datetimeFigureOut">
               <a:rPr lang="de-DE" smtClean="0"/>
-              <a:t>10.11.2021</a:t>
+              <a:t>15.12.2021</a:t>
             </a:fld>
             <a:endParaRPr lang="de-DE"/>
           </a:p>
@@ -1819,7 +1821,7 @@
           <a:p>
             <a:fld id="{7BDCC88A-52A5-4FAB-AE11-7E08D20B4223}" type="datetimeFigureOut">
               <a:rPr lang="de-DE" smtClean="0"/>
-              <a:t>10.11.2021</a:t>
+              <a:t>15.12.2021</a:t>
             </a:fld>
             <a:endParaRPr lang="de-DE"/>
           </a:p>
@@ -1960,7 +1962,7 @@
           <a:p>
             <a:fld id="{7BDCC88A-52A5-4FAB-AE11-7E08D20B4223}" type="datetimeFigureOut">
               <a:rPr lang="de-DE" smtClean="0"/>
-              <a:t>10.11.2021</a:t>
+              <a:t>15.12.2021</a:t>
             </a:fld>
             <a:endParaRPr lang="de-DE"/>
           </a:p>
@@ -2073,7 +2075,7 @@
           <a:p>
             <a:fld id="{7BDCC88A-52A5-4FAB-AE11-7E08D20B4223}" type="datetimeFigureOut">
               <a:rPr lang="de-DE" smtClean="0"/>
-              <a:t>10.11.2021</a:t>
+              <a:t>15.12.2021</a:t>
             </a:fld>
             <a:endParaRPr lang="de-DE"/>
           </a:p>
@@ -2384,7 +2386,7 @@
           <a:p>
             <a:fld id="{7BDCC88A-52A5-4FAB-AE11-7E08D20B4223}" type="datetimeFigureOut">
               <a:rPr lang="de-DE" smtClean="0"/>
-              <a:t>10.11.2021</a:t>
+              <a:t>15.12.2021</a:t>
             </a:fld>
             <a:endParaRPr lang="de-DE"/>
           </a:p>
@@ -2672,7 +2674,7 @@
           <a:p>
             <a:fld id="{7BDCC88A-52A5-4FAB-AE11-7E08D20B4223}" type="datetimeFigureOut">
               <a:rPr lang="de-DE" smtClean="0"/>
-              <a:t>10.11.2021</a:t>
+              <a:t>15.12.2021</a:t>
             </a:fld>
             <a:endParaRPr lang="de-DE"/>
           </a:p>
@@ -2913,7 +2915,7 @@
           <a:p>
             <a:fld id="{7BDCC88A-52A5-4FAB-AE11-7E08D20B4223}" type="datetimeFigureOut">
               <a:rPr lang="de-DE" smtClean="0"/>
-              <a:t>10.11.2021</a:t>
+              <a:t>15.12.2021</a:t>
             </a:fld>
             <a:endParaRPr lang="de-DE"/>
           </a:p>
@@ -5073,7 +5075,7 @@
         </p:blipFill>
         <p:spPr>
           <a:xfrm>
-            <a:off x="698862" y="455813"/>
+            <a:off x="698872" y="1038040"/>
             <a:ext cx="6479990" cy="1313671"/>
           </a:xfrm>
           <a:prstGeom prst="rect">
@@ -5620,6 +5622,1295 @@
     <p:extLst>
       <p:ext uri="{BB962C8B-B14F-4D97-AF65-F5344CB8AC3E}">
         <p14:creationId xmlns:p14="http://schemas.microsoft.com/office/powerpoint/2010/main" val="466638107"/>
+      </p:ext>
+    </p:extLst>
+  </p:cSld>
+  <p:clrMapOvr>
+    <a:masterClrMapping/>
+  </p:clrMapOvr>
+</p:sld>
+</file>
+
+<file path=ppt/slides/slide6.xml><?xml version="1.0" encoding="utf-8"?>
+<p:sld xmlns:a="http://schemas.openxmlformats.org/drawingml/2006/main" xmlns:r="http://schemas.openxmlformats.org/officeDocument/2006/relationships" xmlns:p="http://schemas.openxmlformats.org/presentationml/2006/main">
+  <p:cSld>
+    <p:spTree>
+      <p:nvGrpSpPr>
+        <p:cNvPr id="1" name=""/>
+        <p:cNvGrpSpPr/>
+        <p:nvPr/>
+      </p:nvGrpSpPr>
+      <p:grpSpPr>
+        <a:xfrm>
+          <a:off x="0" y="0"/>
+          <a:ext cx="0" cy="0"/>
+          <a:chOff x="0" y="0"/>
+          <a:chExt cx="0" cy="0"/>
+        </a:xfrm>
+      </p:grpSpPr>
+      <p:sp>
+        <p:nvSpPr>
+          <p:cNvPr id="13" name="Rechteck 12">
+            <a:extLst>
+              <a:ext uri="{FF2B5EF4-FFF2-40B4-BE49-F238E27FC236}">
+                <a16:creationId xmlns:a16="http://schemas.microsoft.com/office/drawing/2014/main" id="{A1E03287-074D-48B4-91AB-8A1D653CC19F}"/>
+              </a:ext>
+            </a:extLst>
+          </p:cNvPr>
+          <p:cNvSpPr/>
+          <p:nvPr/>
+        </p:nvSpPr>
+        <p:spPr>
+          <a:xfrm>
+            <a:off x="0" y="1426265"/>
+            <a:ext cx="12192000" cy="3478696"/>
+          </a:xfrm>
+          <a:prstGeom prst="rect">
+            <a:avLst/>
+          </a:prstGeom>
+          <a:noFill/>
+          <a:ln>
+            <a:noFill/>
+          </a:ln>
+        </p:spPr>
+        <p:style>
+          <a:lnRef idx="2">
+            <a:schemeClr val="accent1">
+              <a:shade val="50000"/>
+            </a:schemeClr>
+          </a:lnRef>
+          <a:fillRef idx="1">
+            <a:schemeClr val="accent1"/>
+          </a:fillRef>
+          <a:effectRef idx="0">
+            <a:schemeClr val="accent1"/>
+          </a:effectRef>
+          <a:fontRef idx="minor">
+            <a:schemeClr val="lt1"/>
+          </a:fontRef>
+        </p:style>
+        <p:txBody>
+          <a:bodyPr rtlCol="0" anchor="ctr"/>
+          <a:lstStyle/>
+          <a:p>
+            <a:pPr algn="ctr"/>
+            <a:endParaRPr lang="en-GB"/>
+          </a:p>
+        </p:txBody>
+      </p:sp>
+      <p:sp>
+        <p:nvSpPr>
+          <p:cNvPr id="8" name="Rechteck: abgerundete Ecken 7">
+            <a:extLst>
+              <a:ext uri="{FF2B5EF4-FFF2-40B4-BE49-F238E27FC236}">
+                <a16:creationId xmlns:a16="http://schemas.microsoft.com/office/drawing/2014/main" id="{F9EFD5E7-9A33-429E-81F0-EDF3FE0800C6}"/>
+              </a:ext>
+            </a:extLst>
+          </p:cNvPr>
+          <p:cNvSpPr/>
+          <p:nvPr/>
+        </p:nvSpPr>
+        <p:spPr>
+          <a:xfrm>
+            <a:off x="9619738" y="1972472"/>
+            <a:ext cx="2160000" cy="2520000"/>
+          </a:xfrm>
+          <a:prstGeom prst="roundRect">
+            <a:avLst/>
+          </a:prstGeom>
+          <a:solidFill>
+            <a:srgbClr val="339933"/>
+          </a:solidFill>
+        </p:spPr>
+        <p:style>
+          <a:lnRef idx="3">
+            <a:schemeClr val="lt1"/>
+          </a:lnRef>
+          <a:fillRef idx="1">
+            <a:schemeClr val="accent6"/>
+          </a:fillRef>
+          <a:effectRef idx="1">
+            <a:schemeClr val="accent6"/>
+          </a:effectRef>
+          <a:fontRef idx="minor">
+            <a:schemeClr val="lt1"/>
+          </a:fontRef>
+        </p:style>
+        <p:txBody>
+          <a:bodyPr rtlCol="0" anchor="t"/>
+          <a:lstStyle/>
+          <a:p>
+            <a:pPr algn="ctr"/>
+            <a:r>
+              <a:rPr lang="de-DE" dirty="0">
+                <a:latin typeface="Lucida Console" panose="020B0609040504020204" pitchFamily="49" charset="0"/>
+              </a:rPr>
+              <a:t>Data</a:t>
+            </a:r>
+            <a:endParaRPr lang="en-GB" dirty="0">
+              <a:latin typeface="Lucida Console" panose="020B0609040504020204" pitchFamily="49" charset="0"/>
+            </a:endParaRPr>
+          </a:p>
+        </p:txBody>
+      </p:sp>
+      <p:sp>
+        <p:nvSpPr>
+          <p:cNvPr id="2" name="Textfeld 1">
+            <a:extLst>
+              <a:ext uri="{FF2B5EF4-FFF2-40B4-BE49-F238E27FC236}">
+                <a16:creationId xmlns:a16="http://schemas.microsoft.com/office/drawing/2014/main" id="{894065E6-C35C-4FEE-82A7-1CA05AAEB6C1}"/>
+              </a:ext>
+            </a:extLst>
+          </p:cNvPr>
+          <p:cNvSpPr txBox="1"/>
+          <p:nvPr/>
+        </p:nvSpPr>
+        <p:spPr>
+          <a:xfrm>
+            <a:off x="325725" y="1972472"/>
+            <a:ext cx="3115734" cy="2520000"/>
+          </a:xfrm>
+          <a:prstGeom prst="roundRect">
+            <a:avLst/>
+          </a:prstGeom>
+          <a:solidFill>
+            <a:schemeClr val="bg1">
+              <a:lumMod val="85000"/>
+            </a:schemeClr>
+          </a:solidFill>
+        </p:spPr>
+        <p:txBody>
+          <a:bodyPr wrap="square" rtlCol="0">
+            <a:spAutoFit/>
+          </a:bodyPr>
+          <a:lstStyle/>
+          <a:p>
+            <a:r>
+              <a:rPr lang="de-DE" dirty="0">
+                <a:latin typeface="Lucida Console" panose="020B0609040504020204" pitchFamily="49" charset="0"/>
+              </a:rPr>
+              <a:t>&lt;</a:t>
+            </a:r>
+            <a:r>
+              <a:rPr lang="de-DE" dirty="0" err="1">
+                <a:latin typeface="Lucida Console" panose="020B0609040504020204" pitchFamily="49" charset="0"/>
+              </a:rPr>
+              <a:t>html</a:t>
+            </a:r>
+            <a:r>
+              <a:rPr lang="de-DE" dirty="0">
+                <a:latin typeface="Lucida Console" panose="020B0609040504020204" pitchFamily="49" charset="0"/>
+              </a:rPr>
+              <a:t>&gt;</a:t>
+            </a:r>
+          </a:p>
+          <a:p>
+            <a:r>
+              <a:rPr lang="de-DE" dirty="0">
+                <a:latin typeface="Lucida Console" panose="020B0609040504020204" pitchFamily="49" charset="0"/>
+              </a:rPr>
+              <a:t>&lt;title&gt; HTML &lt;/title&gt;	</a:t>
+            </a:r>
+          </a:p>
+          <a:p>
+            <a:r>
+              <a:rPr lang="de-DE" dirty="0">
+                <a:latin typeface="Lucida Console" panose="020B0609040504020204" pitchFamily="49" charset="0"/>
+              </a:rPr>
+              <a:t>&lt;</a:t>
+            </a:r>
+            <a:r>
+              <a:rPr lang="de-DE" dirty="0" err="1">
+                <a:latin typeface="Lucida Console" panose="020B0609040504020204" pitchFamily="49" charset="0"/>
+              </a:rPr>
+              <a:t>body</a:t>
+            </a:r>
+            <a:r>
+              <a:rPr lang="de-DE" dirty="0">
+                <a:latin typeface="Lucida Console" panose="020B0609040504020204" pitchFamily="49" charset="0"/>
+              </a:rPr>
+              <a:t>&gt;</a:t>
+            </a:r>
+          </a:p>
+          <a:p>
+            <a:r>
+              <a:rPr lang="de-DE" dirty="0">
+                <a:latin typeface="Lucida Console" panose="020B0609040504020204" pitchFamily="49" charset="0"/>
+              </a:rPr>
+              <a:t>This </a:t>
+            </a:r>
+            <a:r>
+              <a:rPr lang="de-DE" dirty="0" err="1">
+                <a:latin typeface="Lucida Console" panose="020B0609040504020204" pitchFamily="49" charset="0"/>
+              </a:rPr>
+              <a:t>is</a:t>
+            </a:r>
+            <a:r>
+              <a:rPr lang="de-DE" dirty="0">
+                <a:latin typeface="Lucida Console" panose="020B0609040504020204" pitchFamily="49" charset="0"/>
+              </a:rPr>
+              <a:t> HTML!</a:t>
+            </a:r>
+          </a:p>
+          <a:p>
+            <a:r>
+              <a:rPr lang="de-DE" dirty="0">
+                <a:latin typeface="Lucida Console" panose="020B0609040504020204" pitchFamily="49" charset="0"/>
+              </a:rPr>
+              <a:t>&lt;/</a:t>
+            </a:r>
+            <a:r>
+              <a:rPr lang="de-DE" dirty="0" err="1">
+                <a:latin typeface="Lucida Console" panose="020B0609040504020204" pitchFamily="49" charset="0"/>
+              </a:rPr>
+              <a:t>body</a:t>
+            </a:r>
+            <a:r>
+              <a:rPr lang="de-DE" dirty="0">
+                <a:latin typeface="Lucida Console" panose="020B0609040504020204" pitchFamily="49" charset="0"/>
+              </a:rPr>
+              <a:t>&gt;</a:t>
+            </a:r>
+          </a:p>
+          <a:p>
+            <a:r>
+              <a:rPr lang="de-DE" dirty="0">
+                <a:latin typeface="Lucida Console" panose="020B0609040504020204" pitchFamily="49" charset="0"/>
+              </a:rPr>
+              <a:t>&lt;</a:t>
+            </a:r>
+            <a:r>
+              <a:rPr lang="de-DE" dirty="0" err="1">
+                <a:latin typeface="Lucida Console" panose="020B0609040504020204" pitchFamily="49" charset="0"/>
+              </a:rPr>
+              <a:t>html</a:t>
+            </a:r>
+            <a:r>
+              <a:rPr lang="de-DE" dirty="0">
+                <a:latin typeface="Lucida Console" panose="020B0609040504020204" pitchFamily="49" charset="0"/>
+              </a:rPr>
+              <a:t>&gt;</a:t>
+            </a:r>
+            <a:endParaRPr lang="en-GB" dirty="0">
+              <a:latin typeface="Lucida Console" panose="020B0609040504020204" pitchFamily="49" charset="0"/>
+            </a:endParaRPr>
+          </a:p>
+        </p:txBody>
+      </p:sp>
+      <p:pic>
+        <p:nvPicPr>
+          <p:cNvPr id="4" name="Grafik 3">
+            <a:extLst>
+              <a:ext uri="{FF2B5EF4-FFF2-40B4-BE49-F238E27FC236}">
+                <a16:creationId xmlns:a16="http://schemas.microsoft.com/office/drawing/2014/main" id="{E34CA900-6239-414D-AECD-26BB59207338}"/>
+              </a:ext>
+            </a:extLst>
+          </p:cNvPr>
+          <p:cNvPicPr>
+            <a:picLocks noChangeAspect="1"/>
+          </p:cNvPicPr>
+          <p:nvPr/>
+        </p:nvPicPr>
+        <p:blipFill>
+          <a:blip r:embed="rId2">
+            <a:extLst>
+              <a:ext uri="{28A0092B-C50C-407E-A947-70E740481C1C}">
+                <a14:useLocalDpi xmlns:a14="http://schemas.microsoft.com/office/drawing/2010/main" val="0"/>
+              </a:ext>
+            </a:extLst>
+          </a:blip>
+          <a:stretch>
+            <a:fillRect/>
+          </a:stretch>
+        </p:blipFill>
+        <p:spPr>
+          <a:xfrm>
+            <a:off x="4903242" y="1972472"/>
+            <a:ext cx="3254713" cy="2520000"/>
+          </a:xfrm>
+          <a:prstGeom prst="rect">
+            <a:avLst/>
+          </a:prstGeom>
+        </p:spPr>
+      </p:pic>
+      <p:sp>
+        <p:nvSpPr>
+          <p:cNvPr id="5" name="Pfeil: nach rechts 4">
+            <a:extLst>
+              <a:ext uri="{FF2B5EF4-FFF2-40B4-BE49-F238E27FC236}">
+                <a16:creationId xmlns:a16="http://schemas.microsoft.com/office/drawing/2014/main" id="{A749A132-A102-463E-8272-0A3B885F46C6}"/>
+              </a:ext>
+            </a:extLst>
+          </p:cNvPr>
+          <p:cNvSpPr/>
+          <p:nvPr/>
+        </p:nvSpPr>
+        <p:spPr>
+          <a:xfrm>
+            <a:off x="3747851" y="2879633"/>
+            <a:ext cx="848999" cy="705678"/>
+          </a:xfrm>
+          <a:prstGeom prst="rightArrow">
+            <a:avLst/>
+          </a:prstGeom>
+          <a:solidFill>
+            <a:schemeClr val="bg1">
+              <a:lumMod val="85000"/>
+            </a:schemeClr>
+          </a:solidFill>
+          <a:ln>
+            <a:noFill/>
+          </a:ln>
+        </p:spPr>
+        <p:style>
+          <a:lnRef idx="2">
+            <a:schemeClr val="accent1">
+              <a:shade val="50000"/>
+            </a:schemeClr>
+          </a:lnRef>
+          <a:fillRef idx="1">
+            <a:schemeClr val="accent1"/>
+          </a:fillRef>
+          <a:effectRef idx="0">
+            <a:schemeClr val="accent1"/>
+          </a:effectRef>
+          <a:fontRef idx="minor">
+            <a:schemeClr val="lt1"/>
+          </a:fontRef>
+        </p:style>
+        <p:txBody>
+          <a:bodyPr rtlCol="0" anchor="ctr"/>
+          <a:lstStyle/>
+          <a:p>
+            <a:pPr algn="ctr"/>
+            <a:endParaRPr lang="en-GB"/>
+          </a:p>
+        </p:txBody>
+      </p:sp>
+      <p:sp>
+        <p:nvSpPr>
+          <p:cNvPr id="10" name="Pfeil: nach rechts 9">
+            <a:extLst>
+              <a:ext uri="{FF2B5EF4-FFF2-40B4-BE49-F238E27FC236}">
+                <a16:creationId xmlns:a16="http://schemas.microsoft.com/office/drawing/2014/main" id="{E29A3715-E26E-431A-9DB1-CA2FE04516F8}"/>
+              </a:ext>
+            </a:extLst>
+          </p:cNvPr>
+          <p:cNvSpPr/>
+          <p:nvPr/>
+        </p:nvSpPr>
+        <p:spPr>
+          <a:xfrm>
+            <a:off x="8464347" y="2879633"/>
+            <a:ext cx="848999" cy="705678"/>
+          </a:xfrm>
+          <a:prstGeom prst="rightArrow">
+            <a:avLst/>
+          </a:prstGeom>
+          <a:solidFill>
+            <a:schemeClr val="bg1">
+              <a:lumMod val="85000"/>
+            </a:schemeClr>
+          </a:solidFill>
+          <a:ln>
+            <a:noFill/>
+          </a:ln>
+        </p:spPr>
+        <p:style>
+          <a:lnRef idx="2">
+            <a:schemeClr val="accent1">
+              <a:shade val="50000"/>
+            </a:schemeClr>
+          </a:lnRef>
+          <a:fillRef idx="1">
+            <a:schemeClr val="accent1"/>
+          </a:fillRef>
+          <a:effectRef idx="0">
+            <a:schemeClr val="accent1"/>
+          </a:effectRef>
+          <a:fontRef idx="minor">
+            <a:schemeClr val="lt1"/>
+          </a:fontRef>
+        </p:style>
+        <p:txBody>
+          <a:bodyPr rtlCol="0" anchor="ctr"/>
+          <a:lstStyle/>
+          <a:p>
+            <a:pPr algn="ctr"/>
+            <a:endParaRPr lang="en-GB"/>
+          </a:p>
+        </p:txBody>
+      </p:sp>
+      <p:graphicFrame>
+        <p:nvGraphicFramePr>
+          <p:cNvPr id="12" name="Tabelle 12">
+            <a:extLst>
+              <a:ext uri="{FF2B5EF4-FFF2-40B4-BE49-F238E27FC236}">
+                <a16:creationId xmlns:a16="http://schemas.microsoft.com/office/drawing/2014/main" id="{3AAD2C2B-FAC9-4C74-8892-587C1F4654BC}"/>
+              </a:ext>
+            </a:extLst>
+          </p:cNvPr>
+          <p:cNvGraphicFramePr>
+            <a:graphicFrameLocks noGrp="1"/>
+          </p:cNvGraphicFramePr>
+          <p:nvPr>
+            <p:extLst>
+              <p:ext uri="{D42A27DB-BD31-4B8C-83A1-F6EECF244321}">
+                <p14:modId xmlns:p14="http://schemas.microsoft.com/office/powerpoint/2010/main" val="2540306060"/>
+              </p:ext>
+            </p:extLst>
+          </p:nvPr>
+        </p:nvGraphicFramePr>
+        <p:xfrm>
+          <a:off x="9867060" y="2456277"/>
+          <a:ext cx="1734930" cy="1828800"/>
+        </p:xfrm>
+        <a:graphic>
+          <a:graphicData uri="http://schemas.openxmlformats.org/drawingml/2006/table">
+            <a:tbl>
+              <a:tblPr firstRow="1" bandRow="1">
+                <a:tableStyleId>{5940675A-B579-460E-94D1-54222C63F5DA}</a:tableStyleId>
+              </a:tblPr>
+              <a:tblGrid>
+                <a:gridCol w="578310">
+                  <a:extLst>
+                    <a:ext uri="{9D8B030D-6E8A-4147-A177-3AD203B41FA5}">
+                      <a16:colId xmlns:a16="http://schemas.microsoft.com/office/drawing/2014/main" val="474055173"/>
+                    </a:ext>
+                  </a:extLst>
+                </a:gridCol>
+                <a:gridCol w="578310">
+                  <a:extLst>
+                    <a:ext uri="{9D8B030D-6E8A-4147-A177-3AD203B41FA5}">
+                      <a16:colId xmlns:a16="http://schemas.microsoft.com/office/drawing/2014/main" val="3112657295"/>
+                    </a:ext>
+                  </a:extLst>
+                </a:gridCol>
+                <a:gridCol w="578310">
+                  <a:extLst>
+                    <a:ext uri="{9D8B030D-6E8A-4147-A177-3AD203B41FA5}">
+                      <a16:colId xmlns:a16="http://schemas.microsoft.com/office/drawing/2014/main" val="4149819495"/>
+                    </a:ext>
+                  </a:extLst>
+                </a:gridCol>
+              </a:tblGrid>
+              <a:tr h="332020">
+                <a:tc>
+                  <a:txBody>
+                    <a:bodyPr/>
+                    <a:lstStyle/>
+                    <a:p>
+                      <a:endParaRPr lang="en-GB" dirty="0"/>
+                    </a:p>
+                  </a:txBody>
+                  <a:tcPr>
+                    <a:lnL w="38100" cap="flat" cmpd="sng" algn="ctr">
+                      <a:solidFill>
+                        <a:schemeClr val="tx1"/>
+                      </a:solidFill>
+                      <a:prstDash val="solid"/>
+                      <a:round/>
+                      <a:headEnd type="none" w="med" len="med"/>
+                      <a:tailEnd type="none" w="med" len="med"/>
+                    </a:lnL>
+                    <a:lnR w="38100" cap="flat" cmpd="sng" algn="ctr">
+                      <a:solidFill>
+                        <a:schemeClr val="tx1"/>
+                      </a:solidFill>
+                      <a:prstDash val="solid"/>
+                      <a:round/>
+                      <a:headEnd type="none" w="med" len="med"/>
+                      <a:tailEnd type="none" w="med" len="med"/>
+                    </a:lnR>
+                    <a:lnT w="38100" cap="flat" cmpd="sng" algn="ctr">
+                      <a:solidFill>
+                        <a:schemeClr val="tx1"/>
+                      </a:solidFill>
+                      <a:prstDash val="solid"/>
+                      <a:round/>
+                      <a:headEnd type="none" w="med" len="med"/>
+                      <a:tailEnd type="none" w="med" len="med"/>
+                    </a:lnT>
+                    <a:lnB w="38100" cap="flat" cmpd="sng" algn="ctr">
+                      <a:solidFill>
+                        <a:schemeClr val="tx1"/>
+                      </a:solidFill>
+                      <a:prstDash val="solid"/>
+                      <a:round/>
+                      <a:headEnd type="none" w="med" len="med"/>
+                      <a:tailEnd type="none" w="med" len="med"/>
+                    </a:lnB>
+                  </a:tcPr>
+                </a:tc>
+                <a:tc>
+                  <a:txBody>
+                    <a:bodyPr/>
+                    <a:lstStyle/>
+                    <a:p>
+                      <a:endParaRPr lang="en-GB" dirty="0"/>
+                    </a:p>
+                  </a:txBody>
+                  <a:tcPr>
+                    <a:lnL w="38100" cap="flat" cmpd="sng" algn="ctr">
+                      <a:solidFill>
+                        <a:schemeClr val="tx1"/>
+                      </a:solidFill>
+                      <a:prstDash val="solid"/>
+                      <a:round/>
+                      <a:headEnd type="none" w="med" len="med"/>
+                      <a:tailEnd type="none" w="med" len="med"/>
+                    </a:lnL>
+                    <a:lnR w="38100" cap="flat" cmpd="sng" algn="ctr">
+                      <a:solidFill>
+                        <a:schemeClr val="tx1"/>
+                      </a:solidFill>
+                      <a:prstDash val="solid"/>
+                      <a:round/>
+                      <a:headEnd type="none" w="med" len="med"/>
+                      <a:tailEnd type="none" w="med" len="med"/>
+                    </a:lnR>
+                    <a:lnT w="38100" cap="flat" cmpd="sng" algn="ctr">
+                      <a:solidFill>
+                        <a:schemeClr val="tx1"/>
+                      </a:solidFill>
+                      <a:prstDash val="solid"/>
+                      <a:round/>
+                      <a:headEnd type="none" w="med" len="med"/>
+                      <a:tailEnd type="none" w="med" len="med"/>
+                    </a:lnT>
+                    <a:lnB w="38100" cap="flat" cmpd="sng" algn="ctr">
+                      <a:solidFill>
+                        <a:schemeClr val="tx1"/>
+                      </a:solidFill>
+                      <a:prstDash val="solid"/>
+                      <a:round/>
+                      <a:headEnd type="none" w="med" len="med"/>
+                      <a:tailEnd type="none" w="med" len="med"/>
+                    </a:lnB>
+                  </a:tcPr>
+                </a:tc>
+                <a:tc>
+                  <a:txBody>
+                    <a:bodyPr/>
+                    <a:lstStyle/>
+                    <a:p>
+                      <a:endParaRPr lang="en-GB"/>
+                    </a:p>
+                  </a:txBody>
+                  <a:tcPr>
+                    <a:lnL w="38100" cap="flat" cmpd="sng" algn="ctr">
+                      <a:solidFill>
+                        <a:schemeClr val="tx1"/>
+                      </a:solidFill>
+                      <a:prstDash val="solid"/>
+                      <a:round/>
+                      <a:headEnd type="none" w="med" len="med"/>
+                      <a:tailEnd type="none" w="med" len="med"/>
+                    </a:lnL>
+                    <a:lnR w="38100" cap="flat" cmpd="sng" algn="ctr">
+                      <a:solidFill>
+                        <a:schemeClr val="tx1"/>
+                      </a:solidFill>
+                      <a:prstDash val="solid"/>
+                      <a:round/>
+                      <a:headEnd type="none" w="med" len="med"/>
+                      <a:tailEnd type="none" w="med" len="med"/>
+                    </a:lnR>
+                    <a:lnT w="38100" cap="flat" cmpd="sng" algn="ctr">
+                      <a:solidFill>
+                        <a:schemeClr val="tx1"/>
+                      </a:solidFill>
+                      <a:prstDash val="solid"/>
+                      <a:round/>
+                      <a:headEnd type="none" w="med" len="med"/>
+                      <a:tailEnd type="none" w="med" len="med"/>
+                    </a:lnT>
+                    <a:lnB w="38100" cap="flat" cmpd="sng" algn="ctr">
+                      <a:solidFill>
+                        <a:schemeClr val="tx1"/>
+                      </a:solidFill>
+                      <a:prstDash val="solid"/>
+                      <a:round/>
+                      <a:headEnd type="none" w="med" len="med"/>
+                      <a:tailEnd type="none" w="med" len="med"/>
+                    </a:lnB>
+                  </a:tcPr>
+                </a:tc>
+                <a:extLst>
+                  <a:ext uri="{0D108BD9-81ED-4DB2-BD59-A6C34878D82A}">
+                    <a16:rowId xmlns:a16="http://schemas.microsoft.com/office/drawing/2014/main" val="71428776"/>
+                  </a:ext>
+                </a:extLst>
+              </a:tr>
+              <a:tr h="332020">
+                <a:tc>
+                  <a:txBody>
+                    <a:bodyPr/>
+                    <a:lstStyle/>
+                    <a:p>
+                      <a:endParaRPr lang="en-GB"/>
+                    </a:p>
+                  </a:txBody>
+                  <a:tcPr>
+                    <a:lnL w="38100" cap="flat" cmpd="sng" algn="ctr">
+                      <a:solidFill>
+                        <a:schemeClr val="tx1"/>
+                      </a:solidFill>
+                      <a:prstDash val="solid"/>
+                      <a:round/>
+                      <a:headEnd type="none" w="med" len="med"/>
+                      <a:tailEnd type="none" w="med" len="med"/>
+                    </a:lnL>
+                    <a:lnR w="38100" cap="flat" cmpd="sng" algn="ctr">
+                      <a:solidFill>
+                        <a:schemeClr val="tx1"/>
+                      </a:solidFill>
+                      <a:prstDash val="solid"/>
+                      <a:round/>
+                      <a:headEnd type="none" w="med" len="med"/>
+                      <a:tailEnd type="none" w="med" len="med"/>
+                    </a:lnR>
+                    <a:lnT w="38100" cap="flat" cmpd="sng" algn="ctr">
+                      <a:solidFill>
+                        <a:schemeClr val="tx1"/>
+                      </a:solidFill>
+                      <a:prstDash val="solid"/>
+                      <a:round/>
+                      <a:headEnd type="none" w="med" len="med"/>
+                      <a:tailEnd type="none" w="med" len="med"/>
+                    </a:lnT>
+                    <a:lnB w="38100" cap="flat" cmpd="sng" algn="ctr">
+                      <a:solidFill>
+                        <a:schemeClr val="tx1"/>
+                      </a:solidFill>
+                      <a:prstDash val="solid"/>
+                      <a:round/>
+                      <a:headEnd type="none" w="med" len="med"/>
+                      <a:tailEnd type="none" w="med" len="med"/>
+                    </a:lnB>
+                  </a:tcPr>
+                </a:tc>
+                <a:tc>
+                  <a:txBody>
+                    <a:bodyPr/>
+                    <a:lstStyle/>
+                    <a:p>
+                      <a:endParaRPr lang="en-GB" dirty="0"/>
+                    </a:p>
+                  </a:txBody>
+                  <a:tcPr>
+                    <a:lnL w="38100" cap="flat" cmpd="sng" algn="ctr">
+                      <a:solidFill>
+                        <a:schemeClr val="tx1"/>
+                      </a:solidFill>
+                      <a:prstDash val="solid"/>
+                      <a:round/>
+                      <a:headEnd type="none" w="med" len="med"/>
+                      <a:tailEnd type="none" w="med" len="med"/>
+                    </a:lnL>
+                    <a:lnR w="38100" cap="flat" cmpd="sng" algn="ctr">
+                      <a:solidFill>
+                        <a:schemeClr val="tx1"/>
+                      </a:solidFill>
+                      <a:prstDash val="solid"/>
+                      <a:round/>
+                      <a:headEnd type="none" w="med" len="med"/>
+                      <a:tailEnd type="none" w="med" len="med"/>
+                    </a:lnR>
+                    <a:lnT w="38100" cap="flat" cmpd="sng" algn="ctr">
+                      <a:solidFill>
+                        <a:schemeClr val="tx1"/>
+                      </a:solidFill>
+                      <a:prstDash val="solid"/>
+                      <a:round/>
+                      <a:headEnd type="none" w="med" len="med"/>
+                      <a:tailEnd type="none" w="med" len="med"/>
+                    </a:lnT>
+                    <a:lnB w="38100" cap="flat" cmpd="sng" algn="ctr">
+                      <a:solidFill>
+                        <a:schemeClr val="tx1"/>
+                      </a:solidFill>
+                      <a:prstDash val="solid"/>
+                      <a:round/>
+                      <a:headEnd type="none" w="med" len="med"/>
+                      <a:tailEnd type="none" w="med" len="med"/>
+                    </a:lnB>
+                  </a:tcPr>
+                </a:tc>
+                <a:tc>
+                  <a:txBody>
+                    <a:bodyPr/>
+                    <a:lstStyle/>
+                    <a:p>
+                      <a:endParaRPr lang="en-GB"/>
+                    </a:p>
+                  </a:txBody>
+                  <a:tcPr>
+                    <a:lnL w="38100" cap="flat" cmpd="sng" algn="ctr">
+                      <a:solidFill>
+                        <a:schemeClr val="tx1"/>
+                      </a:solidFill>
+                      <a:prstDash val="solid"/>
+                      <a:round/>
+                      <a:headEnd type="none" w="med" len="med"/>
+                      <a:tailEnd type="none" w="med" len="med"/>
+                    </a:lnL>
+                    <a:lnR w="38100" cap="flat" cmpd="sng" algn="ctr">
+                      <a:solidFill>
+                        <a:schemeClr val="tx1"/>
+                      </a:solidFill>
+                      <a:prstDash val="solid"/>
+                      <a:round/>
+                      <a:headEnd type="none" w="med" len="med"/>
+                      <a:tailEnd type="none" w="med" len="med"/>
+                    </a:lnR>
+                    <a:lnT w="38100" cap="flat" cmpd="sng" algn="ctr">
+                      <a:solidFill>
+                        <a:schemeClr val="tx1"/>
+                      </a:solidFill>
+                      <a:prstDash val="solid"/>
+                      <a:round/>
+                      <a:headEnd type="none" w="med" len="med"/>
+                      <a:tailEnd type="none" w="med" len="med"/>
+                    </a:lnT>
+                    <a:lnB w="38100" cap="flat" cmpd="sng" algn="ctr">
+                      <a:solidFill>
+                        <a:schemeClr val="tx1"/>
+                      </a:solidFill>
+                      <a:prstDash val="solid"/>
+                      <a:round/>
+                      <a:headEnd type="none" w="med" len="med"/>
+                      <a:tailEnd type="none" w="med" len="med"/>
+                    </a:lnB>
+                  </a:tcPr>
+                </a:tc>
+                <a:extLst>
+                  <a:ext uri="{0D108BD9-81ED-4DB2-BD59-A6C34878D82A}">
+                    <a16:rowId xmlns:a16="http://schemas.microsoft.com/office/drawing/2014/main" val="3271452051"/>
+                  </a:ext>
+                </a:extLst>
+              </a:tr>
+              <a:tr h="332020">
+                <a:tc>
+                  <a:txBody>
+                    <a:bodyPr/>
+                    <a:lstStyle/>
+                    <a:p>
+                      <a:endParaRPr lang="en-GB"/>
+                    </a:p>
+                  </a:txBody>
+                  <a:tcPr>
+                    <a:lnL w="38100" cap="flat" cmpd="sng" algn="ctr">
+                      <a:solidFill>
+                        <a:schemeClr val="tx1"/>
+                      </a:solidFill>
+                      <a:prstDash val="solid"/>
+                      <a:round/>
+                      <a:headEnd type="none" w="med" len="med"/>
+                      <a:tailEnd type="none" w="med" len="med"/>
+                    </a:lnL>
+                    <a:lnR w="38100" cap="flat" cmpd="sng" algn="ctr">
+                      <a:solidFill>
+                        <a:schemeClr val="tx1"/>
+                      </a:solidFill>
+                      <a:prstDash val="solid"/>
+                      <a:round/>
+                      <a:headEnd type="none" w="med" len="med"/>
+                      <a:tailEnd type="none" w="med" len="med"/>
+                    </a:lnR>
+                    <a:lnT w="38100" cap="flat" cmpd="sng" algn="ctr">
+                      <a:solidFill>
+                        <a:schemeClr val="tx1"/>
+                      </a:solidFill>
+                      <a:prstDash val="solid"/>
+                      <a:round/>
+                      <a:headEnd type="none" w="med" len="med"/>
+                      <a:tailEnd type="none" w="med" len="med"/>
+                    </a:lnT>
+                    <a:lnB w="38100" cap="flat" cmpd="sng" algn="ctr">
+                      <a:solidFill>
+                        <a:schemeClr val="tx1"/>
+                      </a:solidFill>
+                      <a:prstDash val="solid"/>
+                      <a:round/>
+                      <a:headEnd type="none" w="med" len="med"/>
+                      <a:tailEnd type="none" w="med" len="med"/>
+                    </a:lnB>
+                  </a:tcPr>
+                </a:tc>
+                <a:tc>
+                  <a:txBody>
+                    <a:bodyPr/>
+                    <a:lstStyle/>
+                    <a:p>
+                      <a:endParaRPr lang="en-GB" dirty="0"/>
+                    </a:p>
+                  </a:txBody>
+                  <a:tcPr>
+                    <a:lnL w="38100" cap="flat" cmpd="sng" algn="ctr">
+                      <a:solidFill>
+                        <a:schemeClr val="tx1"/>
+                      </a:solidFill>
+                      <a:prstDash val="solid"/>
+                      <a:round/>
+                      <a:headEnd type="none" w="med" len="med"/>
+                      <a:tailEnd type="none" w="med" len="med"/>
+                    </a:lnL>
+                    <a:lnR w="38100" cap="flat" cmpd="sng" algn="ctr">
+                      <a:solidFill>
+                        <a:schemeClr val="tx1"/>
+                      </a:solidFill>
+                      <a:prstDash val="solid"/>
+                      <a:round/>
+                      <a:headEnd type="none" w="med" len="med"/>
+                      <a:tailEnd type="none" w="med" len="med"/>
+                    </a:lnR>
+                    <a:lnT w="38100" cap="flat" cmpd="sng" algn="ctr">
+                      <a:solidFill>
+                        <a:schemeClr val="tx1"/>
+                      </a:solidFill>
+                      <a:prstDash val="solid"/>
+                      <a:round/>
+                      <a:headEnd type="none" w="med" len="med"/>
+                      <a:tailEnd type="none" w="med" len="med"/>
+                    </a:lnT>
+                    <a:lnB w="38100" cap="flat" cmpd="sng" algn="ctr">
+                      <a:solidFill>
+                        <a:schemeClr val="tx1"/>
+                      </a:solidFill>
+                      <a:prstDash val="solid"/>
+                      <a:round/>
+                      <a:headEnd type="none" w="med" len="med"/>
+                      <a:tailEnd type="none" w="med" len="med"/>
+                    </a:lnB>
+                  </a:tcPr>
+                </a:tc>
+                <a:tc>
+                  <a:txBody>
+                    <a:bodyPr/>
+                    <a:lstStyle/>
+                    <a:p>
+                      <a:endParaRPr lang="en-GB"/>
+                    </a:p>
+                  </a:txBody>
+                  <a:tcPr>
+                    <a:lnL w="38100" cap="flat" cmpd="sng" algn="ctr">
+                      <a:solidFill>
+                        <a:schemeClr val="tx1"/>
+                      </a:solidFill>
+                      <a:prstDash val="solid"/>
+                      <a:round/>
+                      <a:headEnd type="none" w="med" len="med"/>
+                      <a:tailEnd type="none" w="med" len="med"/>
+                    </a:lnL>
+                    <a:lnR w="38100" cap="flat" cmpd="sng" algn="ctr">
+                      <a:solidFill>
+                        <a:schemeClr val="tx1"/>
+                      </a:solidFill>
+                      <a:prstDash val="solid"/>
+                      <a:round/>
+                      <a:headEnd type="none" w="med" len="med"/>
+                      <a:tailEnd type="none" w="med" len="med"/>
+                    </a:lnR>
+                    <a:lnT w="38100" cap="flat" cmpd="sng" algn="ctr">
+                      <a:solidFill>
+                        <a:schemeClr val="tx1"/>
+                      </a:solidFill>
+                      <a:prstDash val="solid"/>
+                      <a:round/>
+                      <a:headEnd type="none" w="med" len="med"/>
+                      <a:tailEnd type="none" w="med" len="med"/>
+                    </a:lnT>
+                    <a:lnB w="38100" cap="flat" cmpd="sng" algn="ctr">
+                      <a:solidFill>
+                        <a:schemeClr val="tx1"/>
+                      </a:solidFill>
+                      <a:prstDash val="solid"/>
+                      <a:round/>
+                      <a:headEnd type="none" w="med" len="med"/>
+                      <a:tailEnd type="none" w="med" len="med"/>
+                    </a:lnB>
+                  </a:tcPr>
+                </a:tc>
+                <a:extLst>
+                  <a:ext uri="{0D108BD9-81ED-4DB2-BD59-A6C34878D82A}">
+                    <a16:rowId xmlns:a16="http://schemas.microsoft.com/office/drawing/2014/main" val="4035759651"/>
+                  </a:ext>
+                </a:extLst>
+              </a:tr>
+              <a:tr h="332020">
+                <a:tc>
+                  <a:txBody>
+                    <a:bodyPr/>
+                    <a:lstStyle/>
+                    <a:p>
+                      <a:endParaRPr lang="en-GB"/>
+                    </a:p>
+                  </a:txBody>
+                  <a:tcPr>
+                    <a:lnL w="38100" cap="flat" cmpd="sng" algn="ctr">
+                      <a:solidFill>
+                        <a:schemeClr val="tx1"/>
+                      </a:solidFill>
+                      <a:prstDash val="solid"/>
+                      <a:round/>
+                      <a:headEnd type="none" w="med" len="med"/>
+                      <a:tailEnd type="none" w="med" len="med"/>
+                    </a:lnL>
+                    <a:lnR w="38100" cap="flat" cmpd="sng" algn="ctr">
+                      <a:solidFill>
+                        <a:schemeClr val="tx1"/>
+                      </a:solidFill>
+                      <a:prstDash val="solid"/>
+                      <a:round/>
+                      <a:headEnd type="none" w="med" len="med"/>
+                      <a:tailEnd type="none" w="med" len="med"/>
+                    </a:lnR>
+                    <a:lnT w="38100" cap="flat" cmpd="sng" algn="ctr">
+                      <a:solidFill>
+                        <a:schemeClr val="tx1"/>
+                      </a:solidFill>
+                      <a:prstDash val="solid"/>
+                      <a:round/>
+                      <a:headEnd type="none" w="med" len="med"/>
+                      <a:tailEnd type="none" w="med" len="med"/>
+                    </a:lnT>
+                    <a:lnB w="38100" cap="flat" cmpd="sng" algn="ctr">
+                      <a:solidFill>
+                        <a:schemeClr val="tx1"/>
+                      </a:solidFill>
+                      <a:prstDash val="solid"/>
+                      <a:round/>
+                      <a:headEnd type="none" w="med" len="med"/>
+                      <a:tailEnd type="none" w="med" len="med"/>
+                    </a:lnB>
+                  </a:tcPr>
+                </a:tc>
+                <a:tc>
+                  <a:txBody>
+                    <a:bodyPr/>
+                    <a:lstStyle/>
+                    <a:p>
+                      <a:endParaRPr lang="en-GB" dirty="0"/>
+                    </a:p>
+                  </a:txBody>
+                  <a:tcPr>
+                    <a:lnL w="38100" cap="flat" cmpd="sng" algn="ctr">
+                      <a:solidFill>
+                        <a:schemeClr val="tx1"/>
+                      </a:solidFill>
+                      <a:prstDash val="solid"/>
+                      <a:round/>
+                      <a:headEnd type="none" w="med" len="med"/>
+                      <a:tailEnd type="none" w="med" len="med"/>
+                    </a:lnL>
+                    <a:lnR w="38100" cap="flat" cmpd="sng" algn="ctr">
+                      <a:solidFill>
+                        <a:schemeClr val="tx1"/>
+                      </a:solidFill>
+                      <a:prstDash val="solid"/>
+                      <a:round/>
+                      <a:headEnd type="none" w="med" len="med"/>
+                      <a:tailEnd type="none" w="med" len="med"/>
+                    </a:lnR>
+                    <a:lnT w="38100" cap="flat" cmpd="sng" algn="ctr">
+                      <a:solidFill>
+                        <a:schemeClr val="tx1"/>
+                      </a:solidFill>
+                      <a:prstDash val="solid"/>
+                      <a:round/>
+                      <a:headEnd type="none" w="med" len="med"/>
+                      <a:tailEnd type="none" w="med" len="med"/>
+                    </a:lnT>
+                    <a:lnB w="38100" cap="flat" cmpd="sng" algn="ctr">
+                      <a:solidFill>
+                        <a:schemeClr val="tx1"/>
+                      </a:solidFill>
+                      <a:prstDash val="solid"/>
+                      <a:round/>
+                      <a:headEnd type="none" w="med" len="med"/>
+                      <a:tailEnd type="none" w="med" len="med"/>
+                    </a:lnB>
+                  </a:tcPr>
+                </a:tc>
+                <a:tc>
+                  <a:txBody>
+                    <a:bodyPr/>
+                    <a:lstStyle/>
+                    <a:p>
+                      <a:endParaRPr lang="en-GB"/>
+                    </a:p>
+                  </a:txBody>
+                  <a:tcPr>
+                    <a:lnL w="38100" cap="flat" cmpd="sng" algn="ctr">
+                      <a:solidFill>
+                        <a:schemeClr val="tx1"/>
+                      </a:solidFill>
+                      <a:prstDash val="solid"/>
+                      <a:round/>
+                      <a:headEnd type="none" w="med" len="med"/>
+                      <a:tailEnd type="none" w="med" len="med"/>
+                    </a:lnL>
+                    <a:lnR w="38100" cap="flat" cmpd="sng" algn="ctr">
+                      <a:solidFill>
+                        <a:schemeClr val="tx1"/>
+                      </a:solidFill>
+                      <a:prstDash val="solid"/>
+                      <a:round/>
+                      <a:headEnd type="none" w="med" len="med"/>
+                      <a:tailEnd type="none" w="med" len="med"/>
+                    </a:lnR>
+                    <a:lnT w="38100" cap="flat" cmpd="sng" algn="ctr">
+                      <a:solidFill>
+                        <a:schemeClr val="tx1"/>
+                      </a:solidFill>
+                      <a:prstDash val="solid"/>
+                      <a:round/>
+                      <a:headEnd type="none" w="med" len="med"/>
+                      <a:tailEnd type="none" w="med" len="med"/>
+                    </a:lnT>
+                    <a:lnB w="38100" cap="flat" cmpd="sng" algn="ctr">
+                      <a:solidFill>
+                        <a:schemeClr val="tx1"/>
+                      </a:solidFill>
+                      <a:prstDash val="solid"/>
+                      <a:round/>
+                      <a:headEnd type="none" w="med" len="med"/>
+                      <a:tailEnd type="none" w="med" len="med"/>
+                    </a:lnB>
+                  </a:tcPr>
+                </a:tc>
+                <a:extLst>
+                  <a:ext uri="{0D108BD9-81ED-4DB2-BD59-A6C34878D82A}">
+                    <a16:rowId xmlns:a16="http://schemas.microsoft.com/office/drawing/2014/main" val="1269551187"/>
+                  </a:ext>
+                </a:extLst>
+              </a:tr>
+              <a:tr h="332020">
+                <a:tc>
+                  <a:txBody>
+                    <a:bodyPr/>
+                    <a:lstStyle/>
+                    <a:p>
+                      <a:endParaRPr lang="en-GB" dirty="0"/>
+                    </a:p>
+                  </a:txBody>
+                  <a:tcPr>
+                    <a:lnL w="38100" cap="flat" cmpd="sng" algn="ctr">
+                      <a:solidFill>
+                        <a:schemeClr val="tx1"/>
+                      </a:solidFill>
+                      <a:prstDash val="solid"/>
+                      <a:round/>
+                      <a:headEnd type="none" w="med" len="med"/>
+                      <a:tailEnd type="none" w="med" len="med"/>
+                    </a:lnL>
+                    <a:lnR w="38100" cap="flat" cmpd="sng" algn="ctr">
+                      <a:solidFill>
+                        <a:schemeClr val="tx1"/>
+                      </a:solidFill>
+                      <a:prstDash val="solid"/>
+                      <a:round/>
+                      <a:headEnd type="none" w="med" len="med"/>
+                      <a:tailEnd type="none" w="med" len="med"/>
+                    </a:lnR>
+                    <a:lnT w="38100" cap="flat" cmpd="sng" algn="ctr">
+                      <a:solidFill>
+                        <a:schemeClr val="tx1"/>
+                      </a:solidFill>
+                      <a:prstDash val="solid"/>
+                      <a:round/>
+                      <a:headEnd type="none" w="med" len="med"/>
+                      <a:tailEnd type="none" w="med" len="med"/>
+                    </a:lnT>
+                    <a:lnB w="38100" cap="flat" cmpd="sng" algn="ctr">
+                      <a:solidFill>
+                        <a:schemeClr val="tx1"/>
+                      </a:solidFill>
+                      <a:prstDash val="solid"/>
+                      <a:round/>
+                      <a:headEnd type="none" w="med" len="med"/>
+                      <a:tailEnd type="none" w="med" len="med"/>
+                    </a:lnB>
+                  </a:tcPr>
+                </a:tc>
+                <a:tc>
+                  <a:txBody>
+                    <a:bodyPr/>
+                    <a:lstStyle/>
+                    <a:p>
+                      <a:endParaRPr lang="en-GB" dirty="0"/>
+                    </a:p>
+                  </a:txBody>
+                  <a:tcPr>
+                    <a:lnL w="38100" cap="flat" cmpd="sng" algn="ctr">
+                      <a:solidFill>
+                        <a:schemeClr val="tx1"/>
+                      </a:solidFill>
+                      <a:prstDash val="solid"/>
+                      <a:round/>
+                      <a:headEnd type="none" w="med" len="med"/>
+                      <a:tailEnd type="none" w="med" len="med"/>
+                    </a:lnL>
+                    <a:lnR w="38100" cap="flat" cmpd="sng" algn="ctr">
+                      <a:solidFill>
+                        <a:schemeClr val="tx1"/>
+                      </a:solidFill>
+                      <a:prstDash val="solid"/>
+                      <a:round/>
+                      <a:headEnd type="none" w="med" len="med"/>
+                      <a:tailEnd type="none" w="med" len="med"/>
+                    </a:lnR>
+                    <a:lnT w="38100" cap="flat" cmpd="sng" algn="ctr">
+                      <a:solidFill>
+                        <a:schemeClr val="tx1"/>
+                      </a:solidFill>
+                      <a:prstDash val="solid"/>
+                      <a:round/>
+                      <a:headEnd type="none" w="med" len="med"/>
+                      <a:tailEnd type="none" w="med" len="med"/>
+                    </a:lnT>
+                    <a:lnB w="38100" cap="flat" cmpd="sng" algn="ctr">
+                      <a:solidFill>
+                        <a:schemeClr val="tx1"/>
+                      </a:solidFill>
+                      <a:prstDash val="solid"/>
+                      <a:round/>
+                      <a:headEnd type="none" w="med" len="med"/>
+                      <a:tailEnd type="none" w="med" len="med"/>
+                    </a:lnB>
+                  </a:tcPr>
+                </a:tc>
+                <a:tc>
+                  <a:txBody>
+                    <a:bodyPr/>
+                    <a:lstStyle/>
+                    <a:p>
+                      <a:endParaRPr lang="en-GB" dirty="0"/>
+                    </a:p>
+                  </a:txBody>
+                  <a:tcPr>
+                    <a:lnL w="38100" cap="flat" cmpd="sng" algn="ctr">
+                      <a:solidFill>
+                        <a:schemeClr val="tx1"/>
+                      </a:solidFill>
+                      <a:prstDash val="solid"/>
+                      <a:round/>
+                      <a:headEnd type="none" w="med" len="med"/>
+                      <a:tailEnd type="none" w="med" len="med"/>
+                    </a:lnL>
+                    <a:lnR w="38100" cap="flat" cmpd="sng" algn="ctr">
+                      <a:solidFill>
+                        <a:schemeClr val="tx1"/>
+                      </a:solidFill>
+                      <a:prstDash val="solid"/>
+                      <a:round/>
+                      <a:headEnd type="none" w="med" len="med"/>
+                      <a:tailEnd type="none" w="med" len="med"/>
+                    </a:lnR>
+                    <a:lnT w="38100" cap="flat" cmpd="sng" algn="ctr">
+                      <a:solidFill>
+                        <a:schemeClr val="tx1"/>
+                      </a:solidFill>
+                      <a:prstDash val="solid"/>
+                      <a:round/>
+                      <a:headEnd type="none" w="med" len="med"/>
+                      <a:tailEnd type="none" w="med" len="med"/>
+                    </a:lnT>
+                    <a:lnB w="38100" cap="flat" cmpd="sng" algn="ctr">
+                      <a:solidFill>
+                        <a:schemeClr val="tx1"/>
+                      </a:solidFill>
+                      <a:prstDash val="solid"/>
+                      <a:round/>
+                      <a:headEnd type="none" w="med" len="med"/>
+                      <a:tailEnd type="none" w="med" len="med"/>
+                    </a:lnB>
+                  </a:tcPr>
+                </a:tc>
+                <a:extLst>
+                  <a:ext uri="{0D108BD9-81ED-4DB2-BD59-A6C34878D82A}">
+                    <a16:rowId xmlns:a16="http://schemas.microsoft.com/office/drawing/2014/main" val="1302546984"/>
+                  </a:ext>
+                </a:extLst>
+              </a:tr>
+            </a:tbl>
+          </a:graphicData>
+        </a:graphic>
+      </p:graphicFrame>
+    </p:spTree>
+    <p:extLst>
+      <p:ext uri="{BB962C8B-B14F-4D97-AF65-F5344CB8AC3E}">
+        <p14:creationId xmlns:p14="http://schemas.microsoft.com/office/powerpoint/2010/main" val="3846945025"/>
+      </p:ext>
+    </p:extLst>
+  </p:cSld>
+  <p:clrMapOvr>
+    <a:masterClrMapping/>
+  </p:clrMapOvr>
+</p:sld>
+</file>
+
+<file path=ppt/slides/slide7.xml><?xml version="1.0" encoding="utf-8"?>
+<p:sld xmlns:a="http://schemas.openxmlformats.org/drawingml/2006/main" xmlns:r="http://schemas.openxmlformats.org/officeDocument/2006/relationships" xmlns:p="http://schemas.openxmlformats.org/presentationml/2006/main">
+  <p:cSld>
+    <p:spTree>
+      <p:nvGrpSpPr>
+        <p:cNvPr id="1" name=""/>
+        <p:cNvGrpSpPr/>
+        <p:nvPr/>
+      </p:nvGrpSpPr>
+      <p:grpSpPr>
+        <a:xfrm>
+          <a:off x="0" y="0"/>
+          <a:ext cx="0" cy="0"/>
+          <a:chOff x="0" y="0"/>
+          <a:chExt cx="0" cy="0"/>
+        </a:xfrm>
+      </p:grpSpPr>
+      <p:pic>
+        <p:nvPicPr>
+          <p:cNvPr id="3" name="Grafik 2">
+            <a:extLst>
+              <a:ext uri="{FF2B5EF4-FFF2-40B4-BE49-F238E27FC236}">
+                <a16:creationId xmlns:a16="http://schemas.microsoft.com/office/drawing/2014/main" id="{BC042414-75E5-4529-81B7-596519CAF814}"/>
+              </a:ext>
+            </a:extLst>
+          </p:cNvPr>
+          <p:cNvPicPr>
+            <a:picLocks noChangeAspect="1"/>
+          </p:cNvPicPr>
+          <p:nvPr/>
+        </p:nvPicPr>
+        <p:blipFill>
+          <a:blip r:embed="rId2">
+            <a:extLst>
+              <a:ext uri="{28A0092B-C50C-407E-A947-70E740481C1C}">
+                <a14:useLocalDpi xmlns:a14="http://schemas.microsoft.com/office/drawing/2010/main" val="0"/>
+              </a:ext>
+              <a:ext uri="{96DAC541-7B7A-43D3-8B79-37D633B846F1}">
+                <asvg:svgBlip xmlns:asvg="http://schemas.microsoft.com/office/drawing/2016/SVG/main" r:embed="rId3"/>
+              </a:ext>
+            </a:extLst>
+          </a:blip>
+          <a:stretch>
+            <a:fillRect/>
+          </a:stretch>
+        </p:blipFill>
+        <p:spPr>
+          <a:xfrm>
+            <a:off x="0" y="2509630"/>
+            <a:ext cx="9319287" cy="2658115"/>
+          </a:xfrm>
+          <a:prstGeom prst="rect">
+            <a:avLst/>
+          </a:prstGeom>
+        </p:spPr>
+      </p:pic>
+    </p:spTree>
+    <p:extLst>
+      <p:ext uri="{BB962C8B-B14F-4D97-AF65-F5344CB8AC3E}">
+        <p14:creationId xmlns:p14="http://schemas.microsoft.com/office/powerpoint/2010/main" val="326343678"/>
       </p:ext>
     </p:extLst>
   </p:cSld>

</xml_diff>